<commit_message>
modify pptx and readme. Also add pdf
</commit_message>
<xml_diff>
--- a/docs/1082_datascience_FP_3.pptx
+++ b/docs/1082_datascience_FP_3.pptx
@@ -31,22 +31,20 @@
     <p:sldId id="273" r:id="rId25"/>
     <p:sldId id="289" r:id="rId26"/>
     <p:sldId id="290" r:id="rId27"/>
-    <p:sldId id="296" r:id="rId28"/>
-    <p:sldId id="298" r:id="rId29"/>
-    <p:sldId id="293" r:id="rId30"/>
-    <p:sldId id="301" r:id="rId31"/>
-    <p:sldId id="303" r:id="rId32"/>
-    <p:sldId id="304" r:id="rId33"/>
-    <p:sldId id="302" r:id="rId34"/>
-    <p:sldId id="308" r:id="rId35"/>
-    <p:sldId id="295" r:id="rId36"/>
-    <p:sldId id="299" r:id="rId37"/>
-    <p:sldId id="305" r:id="rId38"/>
-    <p:sldId id="294" r:id="rId39"/>
-    <p:sldId id="309" r:id="rId40"/>
-    <p:sldId id="278" r:id="rId41"/>
-    <p:sldId id="306" r:id="rId42"/>
-    <p:sldId id="263" r:id="rId43"/>
+    <p:sldId id="298" r:id="rId28"/>
+    <p:sldId id="293" r:id="rId29"/>
+    <p:sldId id="301" r:id="rId30"/>
+    <p:sldId id="303" r:id="rId31"/>
+    <p:sldId id="304" r:id="rId32"/>
+    <p:sldId id="302" r:id="rId33"/>
+    <p:sldId id="308" r:id="rId34"/>
+    <p:sldId id="299" r:id="rId35"/>
+    <p:sldId id="305" r:id="rId36"/>
+    <p:sldId id="294" r:id="rId37"/>
+    <p:sldId id="309" r:id="rId38"/>
+    <p:sldId id="278" r:id="rId39"/>
+    <p:sldId id="306" r:id="rId40"/>
+    <p:sldId id="263" r:id="rId41"/>
   </p:sldIdLst>
   <p:sldSz cx="12192000" cy="6858000"/>
   <p:notesSz cx="6858000" cy="9144000"/>
@@ -7589,127 +7587,6 @@
           <a:lstStyle/>
           <a:p>
             <a:r>
-              <a:rPr lang="zh-CN" altLang="en-US" b="1" dirty="0"/>
-              <a:t>需求設定：</a:t>
-            </a:r>
-            <a:endParaRPr lang="en" altLang="zh-TW" b="1" dirty="0"/>
-          </a:p>
-          <a:p>
-            <a:pPr lvl="1"/>
-            <a:r>
-              <a:rPr lang="en" altLang="zh-TW" dirty="0"/>
-              <a:t>Which method do you use?</a:t>
-            </a:r>
-          </a:p>
-          <a:p>
-            <a:pPr lvl="1"/>
-            <a:r>
-              <a:rPr lang="en" altLang="zh-TW" dirty="0"/>
-              <a:t>What is a null model for comparison?</a:t>
-            </a:r>
-          </a:p>
-          <a:p>
-            <a:pPr lvl="1"/>
-            <a:r>
-              <a:rPr lang="en" altLang="zh-TW" dirty="0"/>
-              <a:t>How do your perform evaluation? </a:t>
-            </a:r>
-            <a:r>
-              <a:rPr lang="en" altLang="zh-TW" dirty="0" err="1"/>
-              <a:t>ie</a:t>
-            </a:r>
-            <a:r>
-              <a:rPr lang="en" altLang="zh-TW" dirty="0"/>
-              <a:t>. Cross-validation, or extra separated data</a:t>
-            </a:r>
-          </a:p>
-          <a:p>
-            <a:endParaRPr kumimoji="1" lang="zh-TW" altLang="en-US" dirty="0"/>
-          </a:p>
-        </p:txBody>
-      </p:sp>
-    </p:spTree>
-    <p:extLst>
-      <p:ext uri="{BB962C8B-B14F-4D97-AF65-F5344CB8AC3E}">
-        <p14:creationId xmlns:p14="http://schemas.microsoft.com/office/powerpoint/2010/main" val="1190673799"/>
-      </p:ext>
-    </p:extLst>
-  </p:cSld>
-  <p:clrMapOvr>
-    <a:masterClrMapping/>
-  </p:clrMapOvr>
-</p:sld>
-</file>
-
-<file path=ppt/slides/slide28.xml><?xml version="1.0" encoding="utf-8"?>
-<p:sld xmlns:a="http://schemas.openxmlformats.org/drawingml/2006/main" xmlns:r="http://schemas.openxmlformats.org/officeDocument/2006/relationships" xmlns:p="http://schemas.openxmlformats.org/presentationml/2006/main">
-  <p:cSld>
-    <p:spTree>
-      <p:nvGrpSpPr>
-        <p:cNvPr id="1" name=""/>
-        <p:cNvGrpSpPr/>
-        <p:nvPr/>
-      </p:nvGrpSpPr>
-      <p:grpSpPr>
-        <a:xfrm>
-          <a:off x="0" y="0"/>
-          <a:ext cx="0" cy="0"/>
-          <a:chOff x="0" y="0"/>
-          <a:chExt cx="0" cy="0"/>
-        </a:xfrm>
-      </p:grpSpPr>
-      <p:sp>
-        <p:nvSpPr>
-          <p:cNvPr id="2" name="標題 1">
-            <a:extLst>
-              <a:ext uri="{FF2B5EF4-FFF2-40B4-BE49-F238E27FC236}">
-                <a16:creationId xmlns:a16="http://schemas.microsoft.com/office/drawing/2014/main" id="{06BCB23C-3A68-8A4E-A510-C57DD45C5AF3}"/>
-              </a:ext>
-            </a:extLst>
-          </p:cNvPr>
-          <p:cNvSpPr>
-            <a:spLocks noGrp="1"/>
-          </p:cNvSpPr>
-          <p:nvPr>
-            <p:ph type="title"/>
-          </p:nvPr>
-        </p:nvSpPr>
-        <p:spPr/>
-        <p:txBody>
-          <a:bodyPr>
-            <a:normAutofit fontScale="90000"/>
-          </a:bodyPr>
-          <a:lstStyle/>
-          <a:p>
-            <a:r>
-              <a:rPr kumimoji="1" lang="zh-TW" altLang="en-US" dirty="0"/>
-              <a:t>模型設定及處理</a:t>
-            </a:r>
-          </a:p>
-        </p:txBody>
-      </p:sp>
-      <p:sp>
-        <p:nvSpPr>
-          <p:cNvPr id="3" name="內容版面配置區 2">
-            <a:extLst>
-              <a:ext uri="{FF2B5EF4-FFF2-40B4-BE49-F238E27FC236}">
-                <a16:creationId xmlns:a16="http://schemas.microsoft.com/office/drawing/2014/main" id="{34802F64-9670-A740-A9F8-FA3A45A212DC}"/>
-              </a:ext>
-            </a:extLst>
-          </p:cNvPr>
-          <p:cNvSpPr>
-            <a:spLocks noGrp="1"/>
-          </p:cNvSpPr>
-          <p:nvPr>
-            <p:ph idx="1"/>
-          </p:nvPr>
-        </p:nvSpPr>
-        <p:spPr/>
-        <p:txBody>
-          <a:bodyPr/>
-          <a:lstStyle/>
-          <a:p>
-            <a:r>
               <a:rPr kumimoji="1" lang="en-US" altLang="zh-TW" dirty="0" err="1"/>
               <a:t>XGBoost</a:t>
             </a:r>
@@ -7737,7 +7614,7 @@
 </p:sld>
 </file>
 
-<file path=ppt/slides/slide29.xml><?xml version="1.0" encoding="utf-8"?>
+<file path=ppt/slides/slide28.xml><?xml version="1.0" encoding="utf-8"?>
 <p:sld xmlns:a="http://schemas.openxmlformats.org/drawingml/2006/main" xmlns:r="http://schemas.openxmlformats.org/officeDocument/2006/relationships" xmlns:p="http://schemas.openxmlformats.org/presentationml/2006/main">
   <p:cSld>
     <p:spTree>
@@ -8642,6 +8519,221 @@
 </p:sld>
 </file>
 
+<file path=ppt/slides/slide29.xml><?xml version="1.0" encoding="utf-8"?>
+<p:sld xmlns:a="http://schemas.openxmlformats.org/drawingml/2006/main" xmlns:r="http://schemas.openxmlformats.org/officeDocument/2006/relationships" xmlns:p="http://schemas.openxmlformats.org/presentationml/2006/main">
+  <p:cSld>
+    <p:spTree>
+      <p:nvGrpSpPr>
+        <p:cNvPr id="1" name=""/>
+        <p:cNvGrpSpPr/>
+        <p:nvPr/>
+      </p:nvGrpSpPr>
+      <p:grpSpPr>
+        <a:xfrm>
+          <a:off x="0" y="0"/>
+          <a:ext cx="0" cy="0"/>
+          <a:chOff x="0" y="0"/>
+          <a:chExt cx="0" cy="0"/>
+        </a:xfrm>
+      </p:grpSpPr>
+      <p:sp>
+        <p:nvSpPr>
+          <p:cNvPr id="2" name="標題 1">
+            <a:extLst>
+              <a:ext uri="{FF2B5EF4-FFF2-40B4-BE49-F238E27FC236}">
+                <a16:creationId xmlns:a16="http://schemas.microsoft.com/office/drawing/2014/main" id="{B0CC67CC-5E6F-B84E-85E1-C3E54AD7B313}"/>
+              </a:ext>
+            </a:extLst>
+          </p:cNvPr>
+          <p:cNvSpPr>
+            <a:spLocks noGrp="1"/>
+          </p:cNvSpPr>
+          <p:nvPr>
+            <p:ph type="title"/>
+          </p:nvPr>
+        </p:nvSpPr>
+        <p:spPr/>
+        <p:txBody>
+          <a:bodyPr>
+            <a:normAutofit fontScale="90000"/>
+          </a:bodyPr>
+          <a:lstStyle/>
+          <a:p>
+            <a:r>
+              <a:rPr kumimoji="1" lang="zh-TW" altLang="en-US" dirty="0"/>
+              <a:t>模型設定及處理 </a:t>
+            </a:r>
+            <a:r>
+              <a:rPr lang="en-US" altLang="zh-CN" dirty="0"/>
+              <a:t>– </a:t>
+            </a:r>
+            <a:r>
+              <a:rPr kumimoji="1" lang="en-US" altLang="zh-TW" dirty="0"/>
+              <a:t>Logistic Regression</a:t>
+            </a:r>
+            <a:endParaRPr kumimoji="1" lang="zh-TW" altLang="en-US" dirty="0"/>
+          </a:p>
+        </p:txBody>
+      </p:sp>
+      <p:sp>
+        <p:nvSpPr>
+          <p:cNvPr id="5" name="Content Placeholder 4">
+            <a:extLst>
+              <a:ext uri="{FF2B5EF4-FFF2-40B4-BE49-F238E27FC236}">
+                <a16:creationId xmlns:a16="http://schemas.microsoft.com/office/drawing/2014/main" id="{4D74B448-E076-4E49-BF65-7311F314EE71}"/>
+              </a:ext>
+            </a:extLst>
+          </p:cNvPr>
+          <p:cNvSpPr>
+            <a:spLocks noGrp="1"/>
+          </p:cNvSpPr>
+          <p:nvPr>
+            <p:ph idx="1"/>
+          </p:nvPr>
+        </p:nvSpPr>
+        <p:spPr>
+          <a:xfrm>
+            <a:off x="1451579" y="2015732"/>
+            <a:ext cx="9603275" cy="4138180"/>
+          </a:xfrm>
+        </p:spPr>
+        <p:txBody>
+          <a:bodyPr>
+            <a:normAutofit/>
+          </a:bodyPr>
+          <a:lstStyle/>
+          <a:p>
+            <a:r>
+              <a:rPr lang="zh-CN" altLang="en-US" dirty="0"/>
+              <a:t>特徵選取與特徵轉換：</a:t>
+            </a:r>
+            <a:endParaRPr lang="en-US" altLang="zh-CN" dirty="0"/>
+          </a:p>
+          <a:p>
+            <a:pPr lvl="1"/>
+            <a:r>
+              <a:rPr lang="zh-CN" altLang="en-US" dirty="0"/>
+              <a:t>原始資料：</a:t>
+            </a:r>
+            <a:endParaRPr lang="en-US" altLang="zh-CN" dirty="0"/>
+          </a:p>
+          <a:p>
+            <a:pPr lvl="2"/>
+            <a:r>
+              <a:rPr lang="zh-CN" altLang="en-US" dirty="0"/>
+              <a:t>根據全部資料，利用</a:t>
+            </a:r>
+            <a:r>
+              <a:rPr lang="zh-TW" altLang="en-US" dirty="0"/>
+              <a:t> </a:t>
+            </a:r>
+            <a:r>
+              <a:rPr lang="en-US" altLang="zh-TW" dirty="0"/>
+              <a:t>student t test</a:t>
+            </a:r>
+            <a:r>
+              <a:rPr lang="zh-TW" altLang="en-US" dirty="0"/>
+              <a:t> 來找到對應的</a:t>
+            </a:r>
+            <a:r>
+              <a:rPr lang="en-US" altLang="zh-TW" dirty="0"/>
+              <a:t> t </a:t>
+            </a:r>
+            <a:r>
+              <a:rPr lang="zh-CN" altLang="en-US" dirty="0"/>
+              <a:t>值（</a:t>
+            </a:r>
+            <a:r>
+              <a:rPr lang="en-US" altLang="zh-CN" dirty="0"/>
+              <a:t>P value</a:t>
+            </a:r>
+            <a:r>
+              <a:rPr lang="zh-CN" altLang="en-US" dirty="0"/>
+              <a:t>）</a:t>
+            </a:r>
+            <a:r>
+              <a:rPr lang="en-US" altLang="zh-TW" dirty="0"/>
+              <a:t> </a:t>
+            </a:r>
+            <a:r>
+              <a:rPr lang="zh-TW" altLang="en-US" dirty="0"/>
+              <a:t>，選取重要特徵：</a:t>
+            </a:r>
+            <a:endParaRPr lang="en-US" altLang="zh-TW" dirty="0"/>
+          </a:p>
+          <a:p>
+            <a:pPr lvl="3"/>
+            <a:r>
+              <a:rPr lang="en-US" altLang="zh-TW" dirty="0" err="1"/>
+              <a:t>chest_pain</a:t>
+            </a:r>
+            <a:endParaRPr lang="en-US" altLang="zh-TW" dirty="0"/>
+          </a:p>
+          <a:p>
+            <a:pPr lvl="3"/>
+            <a:r>
+              <a:rPr lang="en-US" altLang="zh-TW" dirty="0"/>
+              <a:t>vessels</a:t>
+            </a:r>
+          </a:p>
+          <a:p>
+            <a:pPr lvl="3"/>
+            <a:r>
+              <a:rPr lang="en-US" altLang="zh-TW" dirty="0" err="1"/>
+              <a:t>thalium_scan</a:t>
+            </a:r>
+            <a:endParaRPr lang="en-US" altLang="zh-CN" dirty="0"/>
+          </a:p>
+        </p:txBody>
+      </p:sp>
+      <p:pic>
+        <p:nvPicPr>
+          <p:cNvPr id="7" name="內容版面配置區 3">
+            <a:extLst>
+              <a:ext uri="{FF2B5EF4-FFF2-40B4-BE49-F238E27FC236}">
+                <a16:creationId xmlns:a16="http://schemas.microsoft.com/office/drawing/2014/main" id="{C81ABB03-FA66-1341-87F0-5A1D0E2B8A0F}"/>
+              </a:ext>
+            </a:extLst>
+          </p:cNvPr>
+          <p:cNvPicPr>
+            <a:picLocks noChangeAspect="1"/>
+          </p:cNvPicPr>
+          <p:nvPr/>
+        </p:nvPicPr>
+        <p:blipFill>
+          <a:blip r:embed="rId2"/>
+          <a:stretch>
+            <a:fillRect/>
+          </a:stretch>
+        </p:blipFill>
+        <p:spPr>
+          <a:xfrm>
+            <a:off x="6096000" y="3308483"/>
+            <a:ext cx="4517136" cy="3364439"/>
+          </a:xfrm>
+          <a:prstGeom prst="rect">
+            <a:avLst/>
+          </a:prstGeom>
+          <a:ln>
+            <a:solidFill>
+              <a:schemeClr val="tx1"/>
+            </a:solidFill>
+          </a:ln>
+        </p:spPr>
+      </p:pic>
+    </p:spTree>
+    <p:extLst>
+      <p:ext uri="{BB962C8B-B14F-4D97-AF65-F5344CB8AC3E}">
+        <p14:creationId xmlns:p14="http://schemas.microsoft.com/office/powerpoint/2010/main" val="3950682577"/>
+      </p:ext>
+    </p:extLst>
+  </p:cSld>
+  <p:clrMapOvr>
+    <a:masterClrMapping/>
+  </p:clrMapOvr>
+</p:sld>
+</file>
+
 <file path=ppt/slides/slide3.xml><?xml version="1.0" encoding="utf-8"?>
 <p:sld xmlns:a="http://schemas.openxmlformats.org/drawingml/2006/main" xmlns:r="http://schemas.openxmlformats.org/officeDocument/2006/relationships" xmlns:p="http://schemas.openxmlformats.org/presentationml/2006/main">
   <p:cSld>
@@ -8890,221 +8982,6 @@
             <a:pPr lvl="1"/>
             <a:r>
               <a:rPr lang="zh-CN" altLang="en-US" dirty="0"/>
-              <a:t>原始資料：</a:t>
-            </a:r>
-            <a:endParaRPr lang="en-US" altLang="zh-CN" dirty="0"/>
-          </a:p>
-          <a:p>
-            <a:pPr lvl="2"/>
-            <a:r>
-              <a:rPr lang="zh-CN" altLang="en-US" dirty="0"/>
-              <a:t>根據全部資料，利用</a:t>
-            </a:r>
-            <a:r>
-              <a:rPr lang="zh-TW" altLang="en-US" dirty="0"/>
-              <a:t> </a:t>
-            </a:r>
-            <a:r>
-              <a:rPr lang="en-US" altLang="zh-TW" dirty="0"/>
-              <a:t>student t test</a:t>
-            </a:r>
-            <a:r>
-              <a:rPr lang="zh-TW" altLang="en-US" dirty="0"/>
-              <a:t> 來找到對應的</a:t>
-            </a:r>
-            <a:r>
-              <a:rPr lang="en-US" altLang="zh-TW" dirty="0"/>
-              <a:t> t </a:t>
-            </a:r>
-            <a:r>
-              <a:rPr lang="zh-CN" altLang="en-US" dirty="0"/>
-              <a:t>值（</a:t>
-            </a:r>
-            <a:r>
-              <a:rPr lang="en-US" altLang="zh-CN" dirty="0"/>
-              <a:t>P value</a:t>
-            </a:r>
-            <a:r>
-              <a:rPr lang="zh-CN" altLang="en-US" dirty="0"/>
-              <a:t>）</a:t>
-            </a:r>
-            <a:r>
-              <a:rPr lang="en-US" altLang="zh-TW" dirty="0"/>
-              <a:t> </a:t>
-            </a:r>
-            <a:r>
-              <a:rPr lang="zh-TW" altLang="en-US" dirty="0"/>
-              <a:t>，選取重要特徵：</a:t>
-            </a:r>
-            <a:endParaRPr lang="en-US" altLang="zh-TW" dirty="0"/>
-          </a:p>
-          <a:p>
-            <a:pPr lvl="3"/>
-            <a:r>
-              <a:rPr lang="en-US" altLang="zh-TW" dirty="0" err="1"/>
-              <a:t>chest_pain</a:t>
-            </a:r>
-            <a:endParaRPr lang="en-US" altLang="zh-TW" dirty="0"/>
-          </a:p>
-          <a:p>
-            <a:pPr lvl="3"/>
-            <a:r>
-              <a:rPr lang="en-US" altLang="zh-TW" dirty="0"/>
-              <a:t>vessels</a:t>
-            </a:r>
-          </a:p>
-          <a:p>
-            <a:pPr lvl="3"/>
-            <a:r>
-              <a:rPr lang="en-US" altLang="zh-TW" dirty="0" err="1"/>
-              <a:t>thalium_scan</a:t>
-            </a:r>
-            <a:endParaRPr lang="en-US" altLang="zh-CN" dirty="0"/>
-          </a:p>
-        </p:txBody>
-      </p:sp>
-      <p:pic>
-        <p:nvPicPr>
-          <p:cNvPr id="7" name="內容版面配置區 3">
-            <a:extLst>
-              <a:ext uri="{FF2B5EF4-FFF2-40B4-BE49-F238E27FC236}">
-                <a16:creationId xmlns:a16="http://schemas.microsoft.com/office/drawing/2014/main" id="{C81ABB03-FA66-1341-87F0-5A1D0E2B8A0F}"/>
-              </a:ext>
-            </a:extLst>
-          </p:cNvPr>
-          <p:cNvPicPr>
-            <a:picLocks noChangeAspect="1"/>
-          </p:cNvPicPr>
-          <p:nvPr/>
-        </p:nvPicPr>
-        <p:blipFill>
-          <a:blip r:embed="rId2"/>
-          <a:stretch>
-            <a:fillRect/>
-          </a:stretch>
-        </p:blipFill>
-        <p:spPr>
-          <a:xfrm>
-            <a:off x="6096000" y="3308483"/>
-            <a:ext cx="4517136" cy="3364439"/>
-          </a:xfrm>
-          <a:prstGeom prst="rect">
-            <a:avLst/>
-          </a:prstGeom>
-          <a:ln>
-            <a:solidFill>
-              <a:schemeClr val="tx1"/>
-            </a:solidFill>
-          </a:ln>
-        </p:spPr>
-      </p:pic>
-    </p:spTree>
-    <p:extLst>
-      <p:ext uri="{BB962C8B-B14F-4D97-AF65-F5344CB8AC3E}">
-        <p14:creationId xmlns:p14="http://schemas.microsoft.com/office/powerpoint/2010/main" val="3950682577"/>
-      </p:ext>
-    </p:extLst>
-  </p:cSld>
-  <p:clrMapOvr>
-    <a:masterClrMapping/>
-  </p:clrMapOvr>
-</p:sld>
-</file>
-
-<file path=ppt/slides/slide31.xml><?xml version="1.0" encoding="utf-8"?>
-<p:sld xmlns:a="http://schemas.openxmlformats.org/drawingml/2006/main" xmlns:r="http://schemas.openxmlformats.org/officeDocument/2006/relationships" xmlns:p="http://schemas.openxmlformats.org/presentationml/2006/main">
-  <p:cSld>
-    <p:spTree>
-      <p:nvGrpSpPr>
-        <p:cNvPr id="1" name=""/>
-        <p:cNvGrpSpPr/>
-        <p:nvPr/>
-      </p:nvGrpSpPr>
-      <p:grpSpPr>
-        <a:xfrm>
-          <a:off x="0" y="0"/>
-          <a:ext cx="0" cy="0"/>
-          <a:chOff x="0" y="0"/>
-          <a:chExt cx="0" cy="0"/>
-        </a:xfrm>
-      </p:grpSpPr>
-      <p:sp>
-        <p:nvSpPr>
-          <p:cNvPr id="2" name="標題 1">
-            <a:extLst>
-              <a:ext uri="{FF2B5EF4-FFF2-40B4-BE49-F238E27FC236}">
-                <a16:creationId xmlns:a16="http://schemas.microsoft.com/office/drawing/2014/main" id="{B0CC67CC-5E6F-B84E-85E1-C3E54AD7B313}"/>
-              </a:ext>
-            </a:extLst>
-          </p:cNvPr>
-          <p:cNvSpPr>
-            <a:spLocks noGrp="1"/>
-          </p:cNvSpPr>
-          <p:nvPr>
-            <p:ph type="title"/>
-          </p:nvPr>
-        </p:nvSpPr>
-        <p:spPr/>
-        <p:txBody>
-          <a:bodyPr>
-            <a:normAutofit fontScale="90000"/>
-          </a:bodyPr>
-          <a:lstStyle/>
-          <a:p>
-            <a:r>
-              <a:rPr kumimoji="1" lang="zh-TW" altLang="en-US" dirty="0"/>
-              <a:t>模型設定及處理 </a:t>
-            </a:r>
-            <a:r>
-              <a:rPr lang="en-US" altLang="zh-CN" dirty="0"/>
-              <a:t>– </a:t>
-            </a:r>
-            <a:r>
-              <a:rPr kumimoji="1" lang="en-US" altLang="zh-TW" dirty="0"/>
-              <a:t>Logistic Regression</a:t>
-            </a:r>
-            <a:endParaRPr kumimoji="1" lang="zh-TW" altLang="en-US" dirty="0"/>
-          </a:p>
-        </p:txBody>
-      </p:sp>
-      <p:sp>
-        <p:nvSpPr>
-          <p:cNvPr id="5" name="Content Placeholder 4">
-            <a:extLst>
-              <a:ext uri="{FF2B5EF4-FFF2-40B4-BE49-F238E27FC236}">
-                <a16:creationId xmlns:a16="http://schemas.microsoft.com/office/drawing/2014/main" id="{4D74B448-E076-4E49-BF65-7311F314EE71}"/>
-              </a:ext>
-            </a:extLst>
-          </p:cNvPr>
-          <p:cNvSpPr>
-            <a:spLocks noGrp="1"/>
-          </p:cNvSpPr>
-          <p:nvPr>
-            <p:ph idx="1"/>
-          </p:nvPr>
-        </p:nvSpPr>
-        <p:spPr>
-          <a:xfrm>
-            <a:off x="1451579" y="2015732"/>
-            <a:ext cx="9603275" cy="4138180"/>
-          </a:xfrm>
-        </p:spPr>
-        <p:txBody>
-          <a:bodyPr>
-            <a:normAutofit/>
-          </a:bodyPr>
-          <a:lstStyle/>
-          <a:p>
-            <a:r>
-              <a:rPr lang="zh-CN" altLang="en-US" dirty="0"/>
-              <a:t>特徵選取與特徵轉換：</a:t>
-            </a:r>
-            <a:endParaRPr lang="en-US" altLang="zh-CN" dirty="0"/>
-          </a:p>
-          <a:p>
-            <a:pPr lvl="1"/>
-            <a:r>
-              <a:rPr lang="zh-CN" altLang="en-US" dirty="0"/>
               <a:t>轉換後資料（非最終模型）：</a:t>
             </a:r>
             <a:endParaRPr lang="en-US" altLang="zh-CN" dirty="0"/>
@@ -9216,7 +9093,7 @@
 </p:sld>
 </file>
 
-<file path=ppt/slides/slide32.xml><?xml version="1.0" encoding="utf-8"?>
+<file path=ppt/slides/slide31.xml><?xml version="1.0" encoding="utf-8"?>
 <p:sld xmlns:a="http://schemas.openxmlformats.org/drawingml/2006/main" xmlns:r="http://schemas.openxmlformats.org/officeDocument/2006/relationships" xmlns:p="http://schemas.openxmlformats.org/presentationml/2006/main">
   <p:cSld>
     <p:spTree>
@@ -9542,7 +9419,7 @@
 </p:sld>
 </file>
 
-<file path=ppt/slides/slide33.xml><?xml version="1.0" encoding="utf-8"?>
+<file path=ppt/slides/slide32.xml><?xml version="1.0" encoding="utf-8"?>
 <p:sld xmlns:a="http://schemas.openxmlformats.org/drawingml/2006/main" xmlns:r="http://schemas.openxmlformats.org/officeDocument/2006/relationships" xmlns:p="http://schemas.openxmlformats.org/presentationml/2006/main">
   <p:cSld>
     <p:spTree>
@@ -10016,7 +9893,7 @@
 </p:sld>
 </file>
 
-<file path=ppt/slides/slide34.xml><?xml version="1.0" encoding="utf-8"?>
+<file path=ppt/slides/slide33.xml><?xml version="1.0" encoding="utf-8"?>
 <p:sld xmlns:a="http://schemas.openxmlformats.org/drawingml/2006/main" xmlns:r="http://schemas.openxmlformats.org/officeDocument/2006/relationships" xmlns:p="http://schemas.openxmlformats.org/presentationml/2006/main">
   <p:cSld>
     <p:spTree>
@@ -10079,116 +9956,149 @@
             <p:ph idx="1"/>
           </p:nvPr>
         </p:nvSpPr>
-        <p:spPr/>
+        <p:spPr>
+          <a:xfrm>
+            <a:off x="1451579" y="2015732"/>
+            <a:ext cx="9603275" cy="4180787"/>
+          </a:xfrm>
+        </p:spPr>
         <p:txBody>
-          <a:bodyPr/>
+          <a:bodyPr>
+            <a:normAutofit lnSpcReduction="10000"/>
+          </a:bodyPr>
           <a:lstStyle/>
           <a:p>
-            <a:r>
-              <a:rPr lang="zh-CN" altLang="en-US" b="1" dirty="0"/>
-              <a:t>需求回應：</a:t>
-            </a:r>
-            <a:endParaRPr lang="en" altLang="zh-TW" b="1" dirty="0"/>
+            <a:pPr marL="0" indent="0">
+              <a:buNone/>
+            </a:pPr>
+            <a:r>
+              <a:rPr lang="zh-CN" altLang="en-US" sz="2400" b="1" dirty="0"/>
+              <a:t>小結：</a:t>
+            </a:r>
+            <a:endParaRPr lang="en" altLang="zh-TW" sz="2400" b="1" dirty="0"/>
+          </a:p>
+          <a:p>
+            <a:r>
+              <a:rPr lang="zh-TW" altLang="en-US" dirty="0"/>
+              <a:t>對於此次比賽我們使用模型有：</a:t>
+            </a:r>
+            <a:r>
+              <a:rPr lang="en-US" dirty="0" err="1"/>
+              <a:t>XGBoost</a:t>
+            </a:r>
+            <a:r>
+              <a:rPr lang="en-US" dirty="0"/>
+              <a:t> / Logistic Regression</a:t>
+            </a:r>
+          </a:p>
+          <a:p>
+            <a:r>
+              <a:rPr lang="zh-TW" altLang="en-US" dirty="0"/>
+              <a:t>針對模型訓練，我們採取以下方式：</a:t>
+            </a:r>
           </a:p>
           <a:p>
             <a:pPr lvl="1"/>
             <a:r>
-              <a:rPr lang="en" altLang="zh-TW" dirty="0"/>
-              <a:t>Which method do you use?</a:t>
-            </a:r>
-            <a:r>
               <a:rPr lang="zh-TW" altLang="en-US" dirty="0"/>
+              <a:t>利用 </a:t>
+            </a:r>
+            <a:r>
+              <a:rPr lang="en-US" dirty="0" err="1"/>
+              <a:t>xgb.importance</a:t>
+            </a:r>
+            <a:r>
+              <a:rPr lang="en-US" dirty="0"/>
               <a:t> </a:t>
             </a:r>
+            <a:r>
+              <a:rPr lang="zh-TW" altLang="en-US" dirty="0"/>
+              <a:t>找出較重要的特徵並訓練模型</a:t>
+            </a:r>
+          </a:p>
+          <a:p>
+            <a:pPr lvl="1"/>
+            <a:r>
+              <a:rPr lang="zh-TW" altLang="en-US" dirty="0"/>
+              <a:t>相對於 </a:t>
+            </a:r>
+            <a:r>
+              <a:rPr lang="en-US" dirty="0"/>
+              <a:t>Null Model，</a:t>
+            </a:r>
+            <a:r>
+              <a:rPr lang="zh-TW" altLang="en-US" dirty="0"/>
+              <a:t>我們有針對飽和模型進行 </a:t>
+            </a:r>
+            <a:r>
+              <a:rPr lang="en-US" dirty="0"/>
+              <a:t>Baseline </a:t>
+            </a:r>
+            <a:r>
+              <a:rPr lang="zh-TW" altLang="en-US" dirty="0"/>
+              <a:t>模型之前的訓練，並利用 </a:t>
+            </a:r>
+            <a:r>
+              <a:rPr lang="en-US" dirty="0"/>
+              <a:t>T Test </a:t>
+            </a:r>
+            <a:r>
+              <a:rPr lang="zh-TW" altLang="en-US" dirty="0"/>
+              <a:t>找到較重要的特徵後，進行該特徵的強化與處理</a:t>
+            </a:r>
+          </a:p>
+          <a:p>
+            <a:pPr lvl="1"/>
+            <a:r>
+              <a:rPr lang="zh-TW" altLang="en-US" dirty="0"/>
+              <a:t>用 </a:t>
+            </a:r>
+            <a:r>
+              <a:rPr lang="en-US" dirty="0"/>
+              <a:t>try and error </a:t>
+            </a:r>
+            <a:r>
+              <a:rPr lang="zh-TW" altLang="en-US" dirty="0"/>
+              <a:t>的精神，根據不同且較重要的特徵選取（結合），進行訓練，挑選較好的模型</a:t>
+            </a:r>
             <a:endParaRPr lang="en-US" altLang="zh-TW" dirty="0"/>
           </a:p>
           <a:p>
-            <a:pPr lvl="2"/>
-            <a:r>
-              <a:rPr lang="en" altLang="zh-TW" dirty="0"/>
-              <a:t>=&gt; </a:t>
-            </a:r>
-            <a:r>
-              <a:rPr lang="en" altLang="zh-TW" dirty="0" err="1"/>
-              <a:t>XGBoost</a:t>
-            </a:r>
-            <a:r>
-              <a:rPr lang="en" altLang="zh-TW" dirty="0"/>
-              <a:t>, Logistic Regression</a:t>
-            </a:r>
-          </a:p>
-          <a:p>
             <a:pPr lvl="1"/>
             <a:r>
-              <a:rPr lang="en" altLang="zh-TW" dirty="0"/>
-              <a:t>What is a null model for comparison?</a:t>
-            </a:r>
-          </a:p>
-          <a:p>
-            <a:pPr lvl="2"/>
-            <a:r>
-              <a:rPr lang="zh-CN" altLang="en-US" dirty="0"/>
-              <a:t>反之，我們有針對飽和模型進行</a:t>
-            </a:r>
-            <a:r>
               <a:rPr lang="zh-TW" altLang="en-US" dirty="0"/>
-              <a:t> </a:t>
-            </a:r>
-            <a:r>
-              <a:rPr lang="en-US" altLang="zh-TW" dirty="0"/>
-              <a:t>Baseline </a:t>
-            </a:r>
-            <a:r>
-              <a:rPr lang="zh-CN" altLang="en-US" dirty="0"/>
-              <a:t>模型之前的訓練</a:t>
-            </a:r>
-            <a:endParaRPr lang="en-US" altLang="zh-CN" dirty="0"/>
-          </a:p>
-          <a:p>
-            <a:pPr lvl="2"/>
-            <a:r>
-              <a:rPr lang="zh-CN" altLang="en-US" dirty="0"/>
-              <a:t>利用</a:t>
+              <a:t>根據 </a:t>
+            </a:r>
+            <a:r>
+              <a:rPr lang="en-US" dirty="0"/>
+              <a:t>proposed-final </a:t>
             </a:r>
             <a:r>
               <a:rPr lang="zh-TW" altLang="en-US" dirty="0"/>
-              <a:t> </a:t>
-            </a:r>
-            <a:r>
-              <a:rPr lang="en-US" altLang="zh-TW" dirty="0"/>
-              <a:t>T Test </a:t>
-            </a:r>
-            <a:r>
-              <a:rPr lang="zh-CN" altLang="en-US" dirty="0"/>
-              <a:t>找到較重要的特徵後，進行該特徵的強化與處理</a:t>
-            </a:r>
-            <a:endParaRPr lang="en" altLang="zh-TW" dirty="0"/>
-          </a:p>
-          <a:p>
-            <a:pPr lvl="1"/>
-            <a:r>
-              <a:rPr lang="en" altLang="zh-TW" dirty="0"/>
-              <a:t>How do your perform evaluation?</a:t>
-            </a:r>
-          </a:p>
-          <a:p>
-            <a:pPr lvl="2"/>
-            <a:r>
-              <a:rPr lang="en" altLang="zh-TW" dirty="0"/>
-              <a:t>=&gt; K-Fold Cross-validation</a:t>
-            </a:r>
-          </a:p>
-          <a:p>
-            <a:pPr lvl="2"/>
-            <a:r>
-              <a:rPr lang="en" altLang="zh-TW" dirty="0"/>
-              <a:t>=&gt; </a:t>
-            </a:r>
-            <a:r>
-              <a:rPr lang="zh-CN" altLang="en-US" dirty="0"/>
-              <a:t>如上所說，進行不同特徵之下的訓練</a:t>
-            </a:r>
-            <a:endParaRPr lang="en" altLang="zh-TW" dirty="0"/>
+              <a:t>模型，我們設不同的 </a:t>
+            </a:r>
+            <a:r>
+              <a:rPr lang="en-US" dirty="0"/>
+              <a:t>seed </a:t>
+            </a:r>
+            <a:r>
+              <a:rPr lang="zh-TW" altLang="en-US" dirty="0"/>
+              <a:t>來訓練模型</a:t>
+            </a:r>
+          </a:p>
+          <a:p>
+            <a:r>
+              <a:rPr lang="zh-TW" altLang="en-US" dirty="0"/>
+              <a:t>我們使用 </a:t>
+            </a:r>
+            <a:r>
+              <a:rPr lang="en-US" dirty="0"/>
+              <a:t>K-Fold Cross Validation </a:t>
+            </a:r>
+            <a:r>
+              <a:rPr lang="zh-TW" altLang="en-US" dirty="0"/>
+              <a:t>來進行模型驗證</a:t>
+            </a:r>
           </a:p>
           <a:p>
             <a:endParaRPr kumimoji="1" lang="zh-TW" altLang="en-US" dirty="0"/>
@@ -10208,124 +10118,7 @@
 </p:sld>
 </file>
 
-<file path=ppt/slides/slide35.xml><?xml version="1.0" encoding="utf-8"?>
-<p:sld xmlns:a="http://schemas.openxmlformats.org/drawingml/2006/main" xmlns:r="http://schemas.openxmlformats.org/officeDocument/2006/relationships" xmlns:p="http://schemas.openxmlformats.org/presentationml/2006/main">
-  <p:cSld>
-    <p:spTree>
-      <p:nvGrpSpPr>
-        <p:cNvPr id="1" name=""/>
-        <p:cNvGrpSpPr/>
-        <p:nvPr/>
-      </p:nvGrpSpPr>
-      <p:grpSpPr>
-        <a:xfrm>
-          <a:off x="0" y="0"/>
-          <a:ext cx="0" cy="0"/>
-          <a:chOff x="0" y="0"/>
-          <a:chExt cx="0" cy="0"/>
-        </a:xfrm>
-      </p:grpSpPr>
-      <p:sp>
-        <p:nvSpPr>
-          <p:cNvPr id="2" name="標題 1">
-            <a:extLst>
-              <a:ext uri="{FF2B5EF4-FFF2-40B4-BE49-F238E27FC236}">
-                <a16:creationId xmlns:a16="http://schemas.microsoft.com/office/drawing/2014/main" id="{335AC284-5B83-EC40-95EC-E81D480FEC11}"/>
-              </a:ext>
-            </a:extLst>
-          </p:cNvPr>
-          <p:cNvSpPr>
-            <a:spLocks noGrp="1"/>
-          </p:cNvSpPr>
-          <p:nvPr>
-            <p:ph type="title"/>
-          </p:nvPr>
-        </p:nvSpPr>
-        <p:spPr/>
-        <p:txBody>
-          <a:bodyPr>
-            <a:normAutofit fontScale="90000"/>
-          </a:bodyPr>
-          <a:lstStyle/>
-          <a:p>
-            <a:r>
-              <a:rPr kumimoji="1" lang="zh-TW" altLang="en-US" dirty="0"/>
-              <a:t>實驗結果</a:t>
-            </a:r>
-          </a:p>
-        </p:txBody>
-      </p:sp>
-      <p:sp>
-        <p:nvSpPr>
-          <p:cNvPr id="3" name="內容版面配置區 2">
-            <a:extLst>
-              <a:ext uri="{FF2B5EF4-FFF2-40B4-BE49-F238E27FC236}">
-                <a16:creationId xmlns:a16="http://schemas.microsoft.com/office/drawing/2014/main" id="{9350CCF5-F508-A044-B7A3-5558B2C57C9D}"/>
-              </a:ext>
-            </a:extLst>
-          </p:cNvPr>
-          <p:cNvSpPr>
-            <a:spLocks noGrp="1"/>
-          </p:cNvSpPr>
-          <p:nvPr>
-            <p:ph idx="1"/>
-          </p:nvPr>
-        </p:nvSpPr>
-        <p:spPr/>
-        <p:txBody>
-          <a:bodyPr/>
-          <a:lstStyle/>
-          <a:p>
-            <a:r>
-              <a:rPr lang="zh-CN" altLang="en-US" b="1" dirty="0"/>
-              <a:t>需求設定：</a:t>
-            </a:r>
-            <a:endParaRPr lang="en-US" altLang="zh-CN" b="1" dirty="0"/>
-          </a:p>
-          <a:p>
-            <a:pPr lvl="1"/>
-            <a:r>
-              <a:rPr lang="en" altLang="zh-TW" dirty="0"/>
-              <a:t>Which metric do you use</a:t>
-            </a:r>
-          </a:p>
-          <a:p>
-            <a:pPr lvl="2"/>
-            <a:r>
-              <a:rPr lang="en" altLang="zh-TW" dirty="0"/>
-              <a:t>precision, recall, R-square</a:t>
-            </a:r>
-          </a:p>
-          <a:p>
-            <a:pPr lvl="1"/>
-            <a:r>
-              <a:rPr lang="en" altLang="zh-TW" dirty="0"/>
-              <a:t>Is your improvement significant?</a:t>
-            </a:r>
-          </a:p>
-          <a:p>
-            <a:pPr lvl="1"/>
-            <a:r>
-              <a:rPr lang="en" altLang="zh-TW" dirty="0"/>
-              <a:t>What is the challenge part of your project?</a:t>
-            </a:r>
-          </a:p>
-        </p:txBody>
-      </p:sp>
-    </p:spTree>
-    <p:extLst>
-      <p:ext uri="{BB962C8B-B14F-4D97-AF65-F5344CB8AC3E}">
-        <p14:creationId xmlns:p14="http://schemas.microsoft.com/office/powerpoint/2010/main" val="1629414706"/>
-      </p:ext>
-    </p:extLst>
-  </p:cSld>
-  <p:clrMapOvr>
-    <a:masterClrMapping/>
-  </p:clrMapOvr>
-</p:sld>
-</file>
-
-<file path=ppt/slides/slide36.xml><?xml version="1.0" encoding="utf-8"?>
+<file path=ppt/slides/slide34.xml><?xml version="1.0" encoding="utf-8"?>
 <p:sld xmlns:a="http://schemas.openxmlformats.org/drawingml/2006/main" xmlns:r="http://schemas.openxmlformats.org/officeDocument/2006/relationships" xmlns:p="http://schemas.openxmlformats.org/presentationml/2006/main">
   <p:cSld>
     <p:spTree>
@@ -11530,7 +11323,7 @@
 </p:sld>
 </file>
 
-<file path=ppt/slides/slide37.xml><?xml version="1.0" encoding="utf-8"?>
+<file path=ppt/slides/slide35.xml><?xml version="1.0" encoding="utf-8"?>
 <p:sld xmlns:a="http://schemas.openxmlformats.org/drawingml/2006/main" xmlns:r="http://schemas.openxmlformats.org/officeDocument/2006/relationships" xmlns:p="http://schemas.openxmlformats.org/presentationml/2006/main">
   <p:cSld>
     <p:spTree>
@@ -11943,7 +11736,7 @@
 </p:sld>
 </file>
 
-<file path=ppt/slides/slide38.xml><?xml version="1.0" encoding="utf-8"?>
+<file path=ppt/slides/slide36.xml><?xml version="1.0" encoding="utf-8"?>
 <p:sld xmlns:a="http://schemas.openxmlformats.org/drawingml/2006/main" xmlns:r="http://schemas.openxmlformats.org/officeDocument/2006/relationships" xmlns:p="http://schemas.openxmlformats.org/presentationml/2006/main">
   <p:cSld>
     <p:spTree>
@@ -12062,7 +11855,7 @@
 </p:sld>
 </file>
 
-<file path=ppt/slides/slide39.xml><?xml version="1.0" encoding="utf-8"?>
+<file path=ppt/slides/slide37.xml><?xml version="1.0" encoding="utf-8"?>
 <p:sld xmlns:a="http://schemas.openxmlformats.org/drawingml/2006/main" xmlns:r="http://schemas.openxmlformats.org/officeDocument/2006/relationships" xmlns:p="http://schemas.openxmlformats.org/presentationml/2006/main">
   <p:cSld>
     <p:spTree>
@@ -12135,109 +11928,50 @@
           <a:bodyPr/>
           <a:lstStyle/>
           <a:p>
-            <a:r>
-              <a:rPr lang="zh-CN" altLang="en-US" b="1" dirty="0"/>
-              <a:t>需求回應：</a:t>
-            </a:r>
-            <a:endParaRPr lang="en-US" altLang="zh-CN" b="1" dirty="0"/>
-          </a:p>
-          <a:p>
-            <a:pPr lvl="1"/>
-            <a:r>
-              <a:rPr lang="en" altLang="zh-TW" dirty="0"/>
-              <a:t>Which metric do you use</a:t>
-            </a:r>
+            <a:pPr marL="0" indent="0">
+              <a:buNone/>
+            </a:pPr>
+            <a:r>
+              <a:rPr lang="zh-CN" altLang="en-US" sz="2800" b="1" dirty="0"/>
+              <a:t>小結：</a:t>
+            </a:r>
+            <a:endParaRPr lang="en-US" altLang="zh-CN" sz="2800" b="1" dirty="0"/>
+          </a:p>
+          <a:p>
             <a:r>
               <a:rPr lang="zh-TW" altLang="en-US" dirty="0"/>
-              <a:t> </a:t>
+              <a:t> 我們使用了 </a:t>
+            </a:r>
+            <a:r>
+              <a:rPr lang="en-US" dirty="0"/>
+              <a:t>Accuracy, Test Error </a:t>
+            </a:r>
+            <a:r>
+              <a:rPr lang="zh-TW" altLang="en-US" dirty="0"/>
+              <a:t>來進行衡量，以找到最佳之模型</a:t>
             </a:r>
             <a:endParaRPr lang="en-US" altLang="zh-TW" dirty="0"/>
           </a:p>
           <a:p>
-            <a:pPr lvl="2"/>
-            <a:r>
-              <a:rPr lang="en-US" altLang="zh-TW" dirty="0"/>
-              <a:t>=&gt; Accuracy, Test Error</a:t>
-            </a:r>
-            <a:endParaRPr lang="en" altLang="zh-TW" dirty="0"/>
-          </a:p>
-          <a:p>
-            <a:pPr lvl="1"/>
-            <a:r>
-              <a:rPr lang="en" altLang="zh-TW" dirty="0"/>
-              <a:t>Is your improvement significant? </a:t>
-            </a:r>
-          </a:p>
-          <a:p>
-            <a:pPr lvl="2"/>
-            <a:r>
-              <a:rPr lang="en" altLang="zh-TW" dirty="0"/>
-              <a:t>=&gt; </a:t>
-            </a:r>
-            <a:r>
-              <a:rPr lang="zh-CN" altLang="en-US" dirty="0"/>
-              <a:t>針對不同的資料處理及標籤設定，會又不同結果</a:t>
-            </a:r>
-            <a:endParaRPr lang="en-US" altLang="zh-CN" dirty="0"/>
-          </a:p>
-          <a:p>
-            <a:pPr lvl="2"/>
-            <a:r>
-              <a:rPr lang="en-US" altLang="zh-TW" dirty="0"/>
-              <a:t>=&gt; </a:t>
-            </a:r>
-            <a:r>
-              <a:rPr lang="zh-CN" altLang="en-US" dirty="0"/>
-              <a:t>不同的模型、</a:t>
-            </a:r>
-            <a:r>
-              <a:rPr lang="en-US" altLang="zh-CN" dirty="0"/>
+            <a:r>
+              <a:rPr lang="zh-TW" altLang="en-US" dirty="0"/>
+              <a:t>針對不同的資料處理及標籤設定，會有不同訓練結果。加上我們採取不同標籤的結合來訓練模型，以及改變 </a:t>
+            </a:r>
+            <a:r>
+              <a:rPr lang="en-US" dirty="0"/>
               <a:t>seed </a:t>
             </a:r>
             <a:r>
-              <a:rPr lang="zh-CN" altLang="en-US" dirty="0"/>
-              <a:t>也會影響結果。</a:t>
-            </a:r>
-            <a:endParaRPr lang="en-US" altLang="zh-CN" dirty="0"/>
-          </a:p>
-          <a:p>
-            <a:pPr lvl="2"/>
-            <a:r>
-              <a:rPr lang="en-US" altLang="zh-TW" dirty="0"/>
-              <a:t>=&gt; </a:t>
-            </a:r>
-            <a:r>
-              <a:rPr lang="zh-CN" altLang="en-US" dirty="0"/>
-              <a:t>綜合以上，我們最後且最佳模型有很大進步</a:t>
-            </a:r>
-            <a:endParaRPr lang="en" altLang="zh-TW" dirty="0"/>
-          </a:p>
-          <a:p>
-            <a:pPr lvl="1"/>
-            <a:r>
-              <a:rPr lang="en" altLang="zh-TW" dirty="0"/>
-              <a:t>What is the challenge part of your project?</a:t>
-            </a:r>
-          </a:p>
-          <a:p>
-            <a:pPr lvl="2"/>
-            <a:r>
-              <a:rPr lang="en" altLang="zh-TW" dirty="0"/>
-              <a:t>=&gt; </a:t>
-            </a:r>
-            <a:r>
-              <a:rPr lang="zh-CN" altLang="en-US" dirty="0"/>
-              <a:t>資料的特徵工程及選擇，因為不知道何者是最重要且必要的特徵</a:t>
-            </a:r>
-            <a:endParaRPr lang="en-US" altLang="zh-CN" dirty="0"/>
-          </a:p>
-          <a:p>
-            <a:pPr lvl="2"/>
-            <a:r>
-              <a:rPr lang="zh-CN" altLang="en-US" dirty="0"/>
-              <a:t>訓練時的抽樣方法也需多加要研究</a:t>
-            </a:r>
-            <a:endParaRPr lang="en" altLang="zh-TW" dirty="0"/>
+              <a:rPr lang="zh-TW" altLang="en-US" dirty="0"/>
+              <a:t>也會影響結果。綜合以上，我們最後且最佳模型有很大進步</a:t>
+            </a:r>
+            <a:endParaRPr lang="en-US" altLang="zh-TW" dirty="0"/>
+          </a:p>
+          <a:p>
+            <a:r>
+              <a:rPr lang="zh-TW" altLang="en-US" dirty="0"/>
+              <a:t>對於此次比賽的結果， 我們認為資料的特徵工程及選擇較為困難，因為不知道何者是最重要且必要的特徵。此外，訓練時的抽樣方法也需多加要研究</a:t>
+            </a:r>
           </a:p>
         </p:txBody>
       </p:sp>
@@ -12245,6 +11979,452 @@
     <p:extLst>
       <p:ext uri="{BB962C8B-B14F-4D97-AF65-F5344CB8AC3E}">
         <p14:creationId xmlns:p14="http://schemas.microsoft.com/office/powerpoint/2010/main" val="3412468321"/>
+      </p:ext>
+    </p:extLst>
+  </p:cSld>
+  <p:clrMapOvr>
+    <a:masterClrMapping/>
+  </p:clrMapOvr>
+</p:sld>
+</file>
+
+<file path=ppt/slides/slide38.xml><?xml version="1.0" encoding="utf-8"?>
+<p:sld xmlns:a="http://schemas.openxmlformats.org/drawingml/2006/main" xmlns:r="http://schemas.openxmlformats.org/officeDocument/2006/relationships" xmlns:p="http://schemas.openxmlformats.org/presentationml/2006/main">
+  <p:cSld>
+    <p:spTree>
+      <p:nvGrpSpPr>
+        <p:cNvPr id="1" name=""/>
+        <p:cNvGrpSpPr/>
+        <p:nvPr/>
+      </p:nvGrpSpPr>
+      <p:grpSpPr>
+        <a:xfrm>
+          <a:off x="0" y="0"/>
+          <a:ext cx="0" cy="0"/>
+          <a:chOff x="0" y="0"/>
+          <a:chExt cx="0" cy="0"/>
+        </a:xfrm>
+      </p:grpSpPr>
+      <p:sp>
+        <p:nvSpPr>
+          <p:cNvPr id="2" name="標題 1">
+            <a:extLst>
+              <a:ext uri="{FF2B5EF4-FFF2-40B4-BE49-F238E27FC236}">
+                <a16:creationId xmlns:a16="http://schemas.microsoft.com/office/drawing/2014/main" id="{EECECADE-F4D4-6844-B3CB-117177C38013}"/>
+              </a:ext>
+            </a:extLst>
+          </p:cNvPr>
+          <p:cNvSpPr>
+            <a:spLocks noGrp="1"/>
+          </p:cNvSpPr>
+          <p:nvPr>
+            <p:ph type="title"/>
+          </p:nvPr>
+        </p:nvSpPr>
+        <p:spPr/>
+        <p:txBody>
+          <a:bodyPr>
+            <a:normAutofit fontScale="90000"/>
+          </a:bodyPr>
+          <a:lstStyle/>
+          <a:p>
+            <a:r>
+              <a:rPr kumimoji="1" lang="zh-TW" altLang="en-US" dirty="0"/>
+              <a:t>參考出處</a:t>
+            </a:r>
+          </a:p>
+        </p:txBody>
+      </p:sp>
+      <p:sp>
+        <p:nvSpPr>
+          <p:cNvPr id="3" name="內容版面配置區 2">
+            <a:extLst>
+              <a:ext uri="{FF2B5EF4-FFF2-40B4-BE49-F238E27FC236}">
+                <a16:creationId xmlns:a16="http://schemas.microsoft.com/office/drawing/2014/main" id="{A5E94ADD-03F4-B94C-9F7E-C5A66F395A8C}"/>
+              </a:ext>
+            </a:extLst>
+          </p:cNvPr>
+          <p:cNvSpPr>
+            <a:spLocks noGrp="1"/>
+          </p:cNvSpPr>
+          <p:nvPr>
+            <p:ph idx="1"/>
+          </p:nvPr>
+        </p:nvSpPr>
+        <p:spPr>
+          <a:xfrm>
+            <a:off x="1451579" y="2015732"/>
+            <a:ext cx="9603275" cy="4156468"/>
+          </a:xfrm>
+        </p:spPr>
+        <p:txBody>
+          <a:bodyPr>
+            <a:normAutofit fontScale="92500" lnSpcReduction="20000"/>
+          </a:bodyPr>
+          <a:lstStyle/>
+          <a:p>
+            <a:r>
+              <a:rPr kumimoji="1" lang="en-US" altLang="zh-TW" dirty="0"/>
+              <a:t>Age interval</a:t>
+            </a:r>
+            <a:r>
+              <a:rPr kumimoji="1" lang="zh-TW" altLang="en-US" dirty="0"/>
+              <a:t>（年齡區間劃分）</a:t>
+            </a:r>
+            <a:endParaRPr kumimoji="1" lang="en-US" altLang="zh-TW" dirty="0"/>
+          </a:p>
+          <a:p>
+            <a:pPr lvl="1"/>
+            <a:r>
+              <a:rPr kumimoji="1" lang="zh-TW" altLang="en-US" dirty="0">
+                <a:hlinkClick r:id="rId2"/>
+              </a:rPr>
+              <a:t>出自</a:t>
+            </a:r>
+            <a:r>
+              <a:rPr kumimoji="1" lang="en-US" altLang="zh-TW" dirty="0">
+                <a:hlinkClick r:id="rId2"/>
+              </a:rPr>
+              <a:t>《</a:t>
+            </a:r>
+            <a:r>
+              <a:rPr kumimoji="1" lang="zh-TW" altLang="en-US" dirty="0">
+                <a:hlinkClick r:id="rId2"/>
+              </a:rPr>
+              <a:t>老年性生理學和老年的性生活</a:t>
+            </a:r>
+            <a:r>
+              <a:rPr kumimoji="1" lang="en-US" altLang="zh-TW" dirty="0">
+                <a:hlinkClick r:id="rId2"/>
+              </a:rPr>
+              <a:t>》</a:t>
+            </a:r>
+            <a:r>
+              <a:rPr kumimoji="1" lang="zh-TW" altLang="en-US" dirty="0">
+                <a:hlinkClick r:id="rId2"/>
+              </a:rPr>
+              <a:t>一書</a:t>
+            </a:r>
+            <a:endParaRPr kumimoji="1" lang="en-US" altLang="zh-TW" dirty="0"/>
+          </a:p>
+          <a:p>
+            <a:r>
+              <a:rPr kumimoji="1" lang="en-US" altLang="zh-TW" dirty="0">
+                <a:hlinkClick r:id="rId3"/>
+              </a:rPr>
+              <a:t>Blood pressure interval</a:t>
+            </a:r>
+            <a:r>
+              <a:rPr kumimoji="1" lang="zh-TW" altLang="en-US" dirty="0">
+                <a:hlinkClick r:id="rId3"/>
+              </a:rPr>
+              <a:t>（血壓區間劃分）</a:t>
+            </a:r>
+            <a:endParaRPr kumimoji="1" lang="en-US" altLang="zh-TW" dirty="0"/>
+          </a:p>
+          <a:p>
+            <a:r>
+              <a:rPr lang="en" altLang="zh-TW" dirty="0" err="1">
+                <a:solidFill>
+                  <a:schemeClr val="dk1"/>
+                </a:solidFill>
+              </a:rPr>
+              <a:t>Cholestoral</a:t>
+            </a:r>
+            <a:r>
+              <a:rPr lang="en" altLang="zh-TW" dirty="0">
+                <a:solidFill>
+                  <a:schemeClr val="dk1"/>
+                </a:solidFill>
+              </a:rPr>
+              <a:t> interval</a:t>
+            </a:r>
+            <a:r>
+              <a:rPr kumimoji="1" lang="zh-TW" altLang="en-US" dirty="0"/>
+              <a:t>（總膽固醇區間劃分）</a:t>
+            </a:r>
+            <a:endParaRPr kumimoji="1" lang="en-US" altLang="zh-TW" dirty="0"/>
+          </a:p>
+          <a:p>
+            <a:pPr lvl="1"/>
+            <a:r>
+              <a:rPr kumimoji="1" lang="zh-CN" altLang="en-US" dirty="0">
+                <a:hlinkClick r:id="rId4"/>
+              </a:rPr>
+              <a:t>啟新診所</a:t>
+            </a:r>
+            <a:endParaRPr kumimoji="1" lang="en-US" altLang="zh-CN" dirty="0"/>
+          </a:p>
+          <a:p>
+            <a:pPr lvl="1"/>
+            <a:r>
+              <a:rPr kumimoji="1" lang="zh-CN" altLang="en-US" dirty="0">
+                <a:hlinkClick r:id="rId5"/>
+              </a:rPr>
+              <a:t>馬偕醫院</a:t>
+            </a:r>
+            <a:endParaRPr kumimoji="1" lang="en-US" altLang="zh-CN" dirty="0"/>
+          </a:p>
+          <a:p>
+            <a:r>
+              <a:rPr kumimoji="1" lang="zh-CN" altLang="en-US" dirty="0"/>
+              <a:t>資料處理：</a:t>
+            </a:r>
+            <a:endParaRPr kumimoji="1" lang="en-US" altLang="zh-CN" dirty="0"/>
+          </a:p>
+          <a:p>
+            <a:pPr lvl="1"/>
+            <a:r>
+              <a:rPr lang="en-US" dirty="0">
+                <a:hlinkClick r:id="rId6"/>
+              </a:rPr>
+              <a:t>https://www.datacamp.com/community/tutorials/contingency-tables-r</a:t>
+            </a:r>
+            <a:endParaRPr lang="en-US" dirty="0"/>
+          </a:p>
+          <a:p>
+            <a:pPr lvl="1"/>
+            <a:r>
+              <a:rPr lang="en-US" dirty="0">
+                <a:hlinkClick r:id="rId7"/>
+              </a:rPr>
+              <a:t>https://www.pluralsight.com/guides/cleaning-up-data-from-outliers</a:t>
+            </a:r>
+            <a:endParaRPr lang="en-US" dirty="0"/>
+          </a:p>
+          <a:p>
+            <a:pPr lvl="1"/>
+            <a:r>
+              <a:rPr lang="en-US" dirty="0">
+                <a:hlinkClick r:id="rId8"/>
+              </a:rPr>
+              <a:t>https://www.gastonsanchez.com/r4strings/formatting.html</a:t>
+            </a:r>
+            <a:endParaRPr lang="en-US" dirty="0"/>
+          </a:p>
+          <a:p>
+            <a:pPr lvl="1"/>
+            <a:r>
+              <a:rPr lang="en-US" dirty="0">
+                <a:hlinkClick r:id="rId9"/>
+              </a:rPr>
+              <a:t>https://www.guru99.com/r-data-frames.html</a:t>
+            </a:r>
+            <a:endParaRPr lang="en-US" dirty="0"/>
+          </a:p>
+          <a:p>
+            <a:endParaRPr kumimoji="1" lang="en-US" altLang="zh-TW" dirty="0"/>
+          </a:p>
+        </p:txBody>
+      </p:sp>
+    </p:spTree>
+    <p:extLst>
+      <p:ext uri="{BB962C8B-B14F-4D97-AF65-F5344CB8AC3E}">
+        <p14:creationId xmlns:p14="http://schemas.microsoft.com/office/powerpoint/2010/main" val="344294703"/>
+      </p:ext>
+    </p:extLst>
+  </p:cSld>
+  <p:clrMapOvr>
+    <a:masterClrMapping/>
+  </p:clrMapOvr>
+</p:sld>
+</file>
+
+<file path=ppt/slides/slide39.xml><?xml version="1.0" encoding="utf-8"?>
+<p:sld xmlns:a="http://schemas.openxmlformats.org/drawingml/2006/main" xmlns:r="http://schemas.openxmlformats.org/officeDocument/2006/relationships" xmlns:p="http://schemas.openxmlformats.org/presentationml/2006/main">
+  <p:cSld>
+    <p:spTree>
+      <p:nvGrpSpPr>
+        <p:cNvPr id="1" name=""/>
+        <p:cNvGrpSpPr/>
+        <p:nvPr/>
+      </p:nvGrpSpPr>
+      <p:grpSpPr>
+        <a:xfrm>
+          <a:off x="0" y="0"/>
+          <a:ext cx="0" cy="0"/>
+          <a:chOff x="0" y="0"/>
+          <a:chExt cx="0" cy="0"/>
+        </a:xfrm>
+      </p:grpSpPr>
+      <p:sp>
+        <p:nvSpPr>
+          <p:cNvPr id="2" name="標題 1">
+            <a:extLst>
+              <a:ext uri="{FF2B5EF4-FFF2-40B4-BE49-F238E27FC236}">
+                <a16:creationId xmlns:a16="http://schemas.microsoft.com/office/drawing/2014/main" id="{EECECADE-F4D4-6844-B3CB-117177C38013}"/>
+              </a:ext>
+            </a:extLst>
+          </p:cNvPr>
+          <p:cNvSpPr>
+            <a:spLocks noGrp="1"/>
+          </p:cNvSpPr>
+          <p:nvPr>
+            <p:ph type="title"/>
+          </p:nvPr>
+        </p:nvSpPr>
+        <p:spPr/>
+        <p:txBody>
+          <a:bodyPr>
+            <a:normAutofit fontScale="90000"/>
+          </a:bodyPr>
+          <a:lstStyle/>
+          <a:p>
+            <a:r>
+              <a:rPr kumimoji="1" lang="zh-TW" altLang="en-US" dirty="0"/>
+              <a:t>參考出處</a:t>
+            </a:r>
+          </a:p>
+        </p:txBody>
+      </p:sp>
+      <p:sp>
+        <p:nvSpPr>
+          <p:cNvPr id="3" name="內容版面配置區 2">
+            <a:extLst>
+              <a:ext uri="{FF2B5EF4-FFF2-40B4-BE49-F238E27FC236}">
+                <a16:creationId xmlns:a16="http://schemas.microsoft.com/office/drawing/2014/main" id="{A5E94ADD-03F4-B94C-9F7E-C5A66F395A8C}"/>
+              </a:ext>
+            </a:extLst>
+          </p:cNvPr>
+          <p:cNvSpPr>
+            <a:spLocks noGrp="1"/>
+          </p:cNvSpPr>
+          <p:nvPr>
+            <p:ph idx="1"/>
+          </p:nvPr>
+        </p:nvSpPr>
+        <p:spPr>
+          <a:xfrm>
+            <a:off x="1451579" y="2015732"/>
+            <a:ext cx="9603275" cy="4156468"/>
+          </a:xfrm>
+        </p:spPr>
+        <p:txBody>
+          <a:bodyPr>
+            <a:normAutofit fontScale="92500" lnSpcReduction="20000"/>
+          </a:bodyPr>
+          <a:lstStyle/>
+          <a:p>
+            <a:r>
+              <a:rPr kumimoji="1" lang="zh-CN" altLang="en-US" dirty="0"/>
+              <a:t>套件引用：</a:t>
+            </a:r>
+            <a:endParaRPr kumimoji="1" lang="en-US" altLang="zh-CN" dirty="0"/>
+          </a:p>
+          <a:p>
+            <a:pPr lvl="1"/>
+            <a:r>
+              <a:rPr lang="en-US" dirty="0">
+                <a:hlinkClick r:id="rId2"/>
+              </a:rPr>
+              <a:t>https://cran.r-project.org/web/packages/hash/hash.pdf</a:t>
+            </a:r>
+            <a:endParaRPr lang="en-US" dirty="0"/>
+          </a:p>
+          <a:p>
+            <a:pPr lvl="1"/>
+            <a:r>
+              <a:rPr lang="en-US" dirty="0">
+                <a:hlinkClick r:id="rId3"/>
+              </a:rPr>
+              <a:t>https://stackoverflow.com/questions/23765996/get-all-keys-from-ruby-hash</a:t>
+            </a:r>
+            <a:endParaRPr lang="en-US" dirty="0"/>
+          </a:p>
+          <a:p>
+            <a:pPr lvl="1"/>
+            <a:r>
+              <a:rPr lang="en-US" dirty="0">
+                <a:hlinkClick r:id="rId4"/>
+              </a:rPr>
+              <a:t>https://www.rdocumentation.org/packages/tibble/versions/1.4.2/topics/add_column</a:t>
+            </a:r>
+            <a:endParaRPr lang="en-US" dirty="0"/>
+          </a:p>
+          <a:p>
+            <a:pPr lvl="1"/>
+            <a:r>
+              <a:rPr lang="en-US" dirty="0">
+                <a:hlinkClick r:id="rId5"/>
+              </a:rPr>
+              <a:t>https://stackoverflow.com/questions/45741498/add-column-in-tibble-with-variable-column-name</a:t>
+            </a:r>
+            <a:endParaRPr lang="en-US" dirty="0"/>
+          </a:p>
+          <a:p>
+            <a:pPr lvl="1"/>
+            <a:r>
+              <a:rPr lang="en-US" dirty="0">
+                <a:hlinkClick r:id="rId6"/>
+              </a:rPr>
+              <a:t>https://statmath.wu.ac.at/projects/vcd/</a:t>
+            </a:r>
+            <a:endParaRPr lang="en-US" dirty="0"/>
+          </a:p>
+          <a:p>
+            <a:pPr lvl="1"/>
+            <a:r>
+              <a:rPr lang="en-US" dirty="0">
+                <a:hlinkClick r:id="rId7"/>
+              </a:rPr>
+              <a:t>https://rdrr.io/cran/infotheo/man/mutinformation.html</a:t>
+            </a:r>
+            <a:endParaRPr lang="en-US" dirty="0"/>
+          </a:p>
+          <a:p>
+            <a:pPr lvl="1"/>
+            <a:r>
+              <a:rPr lang="en-US" dirty="0">
+                <a:hlinkClick r:id="rId8"/>
+              </a:rPr>
+              <a:t>https://cran.r-project.org/web/packages/infotheo/infotheo.pdf</a:t>
+            </a:r>
+            <a:endParaRPr lang="en-US" dirty="0"/>
+          </a:p>
+          <a:p>
+            <a:pPr lvl="1"/>
+            <a:r>
+              <a:rPr lang="en-US" dirty="0">
+                <a:hlinkClick r:id="rId9"/>
+              </a:rPr>
+              <a:t>https://www.rdocumentation.org/packages/stringr</a:t>
+            </a:r>
+            <a:endParaRPr lang="en-US" dirty="0"/>
+          </a:p>
+          <a:p>
+            <a:pPr lvl="1"/>
+            <a:r>
+              <a:rPr lang="en-US" dirty="0">
+                <a:hlinkClick r:id="rId10"/>
+              </a:rPr>
+              <a:t>https://stringr.tidyverse.org/reference/str_detect.html</a:t>
+            </a:r>
+            <a:endParaRPr lang="en-US" dirty="0"/>
+          </a:p>
+          <a:p>
+            <a:pPr lvl="1"/>
+            <a:r>
+              <a:rPr lang="en-US" dirty="0">
+                <a:hlinkClick r:id="rId11"/>
+              </a:rPr>
+              <a:t>https://www.rdocumentation.org/packages/vcd/</a:t>
+            </a:r>
+            <a:endParaRPr kumimoji="1" lang="en-US" altLang="zh-TW" dirty="0"/>
+          </a:p>
+          <a:p>
+            <a:pPr lvl="1"/>
+            <a:endParaRPr kumimoji="1" lang="en-US" altLang="zh-TW" dirty="0"/>
+          </a:p>
+          <a:p>
+            <a:pPr lvl="1"/>
+            <a:endParaRPr kumimoji="1" lang="en-US" altLang="zh-TW" dirty="0"/>
+          </a:p>
+        </p:txBody>
+      </p:sp>
+    </p:spTree>
+    <p:extLst>
+      <p:ext uri="{BB962C8B-B14F-4D97-AF65-F5344CB8AC3E}">
+        <p14:creationId xmlns:p14="http://schemas.microsoft.com/office/powerpoint/2010/main" val="3926490653"/>
       </p:ext>
     </p:extLst>
   </p:cSld>
@@ -13022,452 +13202,6 @@
 </file>
 
 <file path=ppt/slides/slide40.xml><?xml version="1.0" encoding="utf-8"?>
-<p:sld xmlns:a="http://schemas.openxmlformats.org/drawingml/2006/main" xmlns:r="http://schemas.openxmlformats.org/officeDocument/2006/relationships" xmlns:p="http://schemas.openxmlformats.org/presentationml/2006/main">
-  <p:cSld>
-    <p:spTree>
-      <p:nvGrpSpPr>
-        <p:cNvPr id="1" name=""/>
-        <p:cNvGrpSpPr/>
-        <p:nvPr/>
-      </p:nvGrpSpPr>
-      <p:grpSpPr>
-        <a:xfrm>
-          <a:off x="0" y="0"/>
-          <a:ext cx="0" cy="0"/>
-          <a:chOff x="0" y="0"/>
-          <a:chExt cx="0" cy="0"/>
-        </a:xfrm>
-      </p:grpSpPr>
-      <p:sp>
-        <p:nvSpPr>
-          <p:cNvPr id="2" name="標題 1">
-            <a:extLst>
-              <a:ext uri="{FF2B5EF4-FFF2-40B4-BE49-F238E27FC236}">
-                <a16:creationId xmlns:a16="http://schemas.microsoft.com/office/drawing/2014/main" id="{EECECADE-F4D4-6844-B3CB-117177C38013}"/>
-              </a:ext>
-            </a:extLst>
-          </p:cNvPr>
-          <p:cNvSpPr>
-            <a:spLocks noGrp="1"/>
-          </p:cNvSpPr>
-          <p:nvPr>
-            <p:ph type="title"/>
-          </p:nvPr>
-        </p:nvSpPr>
-        <p:spPr/>
-        <p:txBody>
-          <a:bodyPr>
-            <a:normAutofit fontScale="90000"/>
-          </a:bodyPr>
-          <a:lstStyle/>
-          <a:p>
-            <a:r>
-              <a:rPr kumimoji="1" lang="zh-TW" altLang="en-US" dirty="0"/>
-              <a:t>參考出處</a:t>
-            </a:r>
-          </a:p>
-        </p:txBody>
-      </p:sp>
-      <p:sp>
-        <p:nvSpPr>
-          <p:cNvPr id="3" name="內容版面配置區 2">
-            <a:extLst>
-              <a:ext uri="{FF2B5EF4-FFF2-40B4-BE49-F238E27FC236}">
-                <a16:creationId xmlns:a16="http://schemas.microsoft.com/office/drawing/2014/main" id="{A5E94ADD-03F4-B94C-9F7E-C5A66F395A8C}"/>
-              </a:ext>
-            </a:extLst>
-          </p:cNvPr>
-          <p:cNvSpPr>
-            <a:spLocks noGrp="1"/>
-          </p:cNvSpPr>
-          <p:nvPr>
-            <p:ph idx="1"/>
-          </p:nvPr>
-        </p:nvSpPr>
-        <p:spPr>
-          <a:xfrm>
-            <a:off x="1451579" y="2015732"/>
-            <a:ext cx="9603275" cy="4156468"/>
-          </a:xfrm>
-        </p:spPr>
-        <p:txBody>
-          <a:bodyPr>
-            <a:normAutofit fontScale="92500" lnSpcReduction="20000"/>
-          </a:bodyPr>
-          <a:lstStyle/>
-          <a:p>
-            <a:r>
-              <a:rPr kumimoji="1" lang="en-US" altLang="zh-TW" dirty="0"/>
-              <a:t>Age interval</a:t>
-            </a:r>
-            <a:r>
-              <a:rPr kumimoji="1" lang="zh-TW" altLang="en-US" dirty="0"/>
-              <a:t>（年齡區間劃分）</a:t>
-            </a:r>
-            <a:endParaRPr kumimoji="1" lang="en-US" altLang="zh-TW" dirty="0"/>
-          </a:p>
-          <a:p>
-            <a:pPr lvl="1"/>
-            <a:r>
-              <a:rPr kumimoji="1" lang="zh-TW" altLang="en-US" dirty="0">
-                <a:hlinkClick r:id="rId2"/>
-              </a:rPr>
-              <a:t>出自</a:t>
-            </a:r>
-            <a:r>
-              <a:rPr kumimoji="1" lang="en-US" altLang="zh-TW" dirty="0">
-                <a:hlinkClick r:id="rId2"/>
-              </a:rPr>
-              <a:t>《</a:t>
-            </a:r>
-            <a:r>
-              <a:rPr kumimoji="1" lang="zh-TW" altLang="en-US" dirty="0">
-                <a:hlinkClick r:id="rId2"/>
-              </a:rPr>
-              <a:t>老年性生理學和老年的性生活</a:t>
-            </a:r>
-            <a:r>
-              <a:rPr kumimoji="1" lang="en-US" altLang="zh-TW" dirty="0">
-                <a:hlinkClick r:id="rId2"/>
-              </a:rPr>
-              <a:t>》</a:t>
-            </a:r>
-            <a:r>
-              <a:rPr kumimoji="1" lang="zh-TW" altLang="en-US" dirty="0">
-                <a:hlinkClick r:id="rId2"/>
-              </a:rPr>
-              <a:t>一書</a:t>
-            </a:r>
-            <a:endParaRPr kumimoji="1" lang="en-US" altLang="zh-TW" dirty="0"/>
-          </a:p>
-          <a:p>
-            <a:r>
-              <a:rPr kumimoji="1" lang="en-US" altLang="zh-TW" dirty="0">
-                <a:hlinkClick r:id="rId3"/>
-              </a:rPr>
-              <a:t>Blood pressure interval</a:t>
-            </a:r>
-            <a:r>
-              <a:rPr kumimoji="1" lang="zh-TW" altLang="en-US" dirty="0">
-                <a:hlinkClick r:id="rId3"/>
-              </a:rPr>
-              <a:t>（血壓區間劃分）</a:t>
-            </a:r>
-            <a:endParaRPr kumimoji="1" lang="en-US" altLang="zh-TW" dirty="0"/>
-          </a:p>
-          <a:p>
-            <a:r>
-              <a:rPr lang="en" altLang="zh-TW" dirty="0" err="1">
-                <a:solidFill>
-                  <a:schemeClr val="dk1"/>
-                </a:solidFill>
-              </a:rPr>
-              <a:t>Cholestoral</a:t>
-            </a:r>
-            <a:r>
-              <a:rPr lang="en" altLang="zh-TW" dirty="0">
-                <a:solidFill>
-                  <a:schemeClr val="dk1"/>
-                </a:solidFill>
-              </a:rPr>
-              <a:t> interval</a:t>
-            </a:r>
-            <a:r>
-              <a:rPr kumimoji="1" lang="zh-TW" altLang="en-US" dirty="0"/>
-              <a:t>（總膽固醇區間劃分）</a:t>
-            </a:r>
-            <a:endParaRPr kumimoji="1" lang="en-US" altLang="zh-TW" dirty="0"/>
-          </a:p>
-          <a:p>
-            <a:pPr lvl="1"/>
-            <a:r>
-              <a:rPr kumimoji="1" lang="zh-CN" altLang="en-US" dirty="0">
-                <a:hlinkClick r:id="rId4"/>
-              </a:rPr>
-              <a:t>啟新診所</a:t>
-            </a:r>
-            <a:endParaRPr kumimoji="1" lang="en-US" altLang="zh-CN" dirty="0"/>
-          </a:p>
-          <a:p>
-            <a:pPr lvl="1"/>
-            <a:r>
-              <a:rPr kumimoji="1" lang="zh-CN" altLang="en-US" dirty="0">
-                <a:hlinkClick r:id="rId5"/>
-              </a:rPr>
-              <a:t>馬偕醫院</a:t>
-            </a:r>
-            <a:endParaRPr kumimoji="1" lang="en-US" altLang="zh-CN" dirty="0"/>
-          </a:p>
-          <a:p>
-            <a:r>
-              <a:rPr kumimoji="1" lang="zh-CN" altLang="en-US" dirty="0"/>
-              <a:t>資料處理：</a:t>
-            </a:r>
-            <a:endParaRPr kumimoji="1" lang="en-US" altLang="zh-CN" dirty="0"/>
-          </a:p>
-          <a:p>
-            <a:pPr lvl="1"/>
-            <a:r>
-              <a:rPr lang="en-US" dirty="0">
-                <a:hlinkClick r:id="rId6"/>
-              </a:rPr>
-              <a:t>https://www.datacamp.com/community/tutorials/contingency-tables-r</a:t>
-            </a:r>
-            <a:endParaRPr lang="en-US" dirty="0"/>
-          </a:p>
-          <a:p>
-            <a:pPr lvl="1"/>
-            <a:r>
-              <a:rPr lang="en-US" dirty="0">
-                <a:hlinkClick r:id="rId7"/>
-              </a:rPr>
-              <a:t>https://www.pluralsight.com/guides/cleaning-up-data-from-outliers</a:t>
-            </a:r>
-            <a:endParaRPr lang="en-US" dirty="0"/>
-          </a:p>
-          <a:p>
-            <a:pPr lvl="1"/>
-            <a:r>
-              <a:rPr lang="en-US" dirty="0">
-                <a:hlinkClick r:id="rId8"/>
-              </a:rPr>
-              <a:t>https://www.gastonsanchez.com/r4strings/formatting.html</a:t>
-            </a:r>
-            <a:endParaRPr lang="en-US" dirty="0"/>
-          </a:p>
-          <a:p>
-            <a:pPr lvl="1"/>
-            <a:r>
-              <a:rPr lang="en-US" dirty="0">
-                <a:hlinkClick r:id="rId9"/>
-              </a:rPr>
-              <a:t>https://www.guru99.com/r-data-frames.html</a:t>
-            </a:r>
-            <a:endParaRPr lang="en-US" dirty="0"/>
-          </a:p>
-          <a:p>
-            <a:endParaRPr kumimoji="1" lang="en-US" altLang="zh-TW" dirty="0"/>
-          </a:p>
-        </p:txBody>
-      </p:sp>
-    </p:spTree>
-    <p:extLst>
-      <p:ext uri="{BB962C8B-B14F-4D97-AF65-F5344CB8AC3E}">
-        <p14:creationId xmlns:p14="http://schemas.microsoft.com/office/powerpoint/2010/main" val="344294703"/>
-      </p:ext>
-    </p:extLst>
-  </p:cSld>
-  <p:clrMapOvr>
-    <a:masterClrMapping/>
-  </p:clrMapOvr>
-</p:sld>
-</file>
-
-<file path=ppt/slides/slide41.xml><?xml version="1.0" encoding="utf-8"?>
-<p:sld xmlns:a="http://schemas.openxmlformats.org/drawingml/2006/main" xmlns:r="http://schemas.openxmlformats.org/officeDocument/2006/relationships" xmlns:p="http://schemas.openxmlformats.org/presentationml/2006/main">
-  <p:cSld>
-    <p:spTree>
-      <p:nvGrpSpPr>
-        <p:cNvPr id="1" name=""/>
-        <p:cNvGrpSpPr/>
-        <p:nvPr/>
-      </p:nvGrpSpPr>
-      <p:grpSpPr>
-        <a:xfrm>
-          <a:off x="0" y="0"/>
-          <a:ext cx="0" cy="0"/>
-          <a:chOff x="0" y="0"/>
-          <a:chExt cx="0" cy="0"/>
-        </a:xfrm>
-      </p:grpSpPr>
-      <p:sp>
-        <p:nvSpPr>
-          <p:cNvPr id="2" name="標題 1">
-            <a:extLst>
-              <a:ext uri="{FF2B5EF4-FFF2-40B4-BE49-F238E27FC236}">
-                <a16:creationId xmlns:a16="http://schemas.microsoft.com/office/drawing/2014/main" id="{EECECADE-F4D4-6844-B3CB-117177C38013}"/>
-              </a:ext>
-            </a:extLst>
-          </p:cNvPr>
-          <p:cNvSpPr>
-            <a:spLocks noGrp="1"/>
-          </p:cNvSpPr>
-          <p:nvPr>
-            <p:ph type="title"/>
-          </p:nvPr>
-        </p:nvSpPr>
-        <p:spPr/>
-        <p:txBody>
-          <a:bodyPr>
-            <a:normAutofit fontScale="90000"/>
-          </a:bodyPr>
-          <a:lstStyle/>
-          <a:p>
-            <a:r>
-              <a:rPr kumimoji="1" lang="zh-TW" altLang="en-US" dirty="0"/>
-              <a:t>參考出處</a:t>
-            </a:r>
-          </a:p>
-        </p:txBody>
-      </p:sp>
-      <p:sp>
-        <p:nvSpPr>
-          <p:cNvPr id="3" name="內容版面配置區 2">
-            <a:extLst>
-              <a:ext uri="{FF2B5EF4-FFF2-40B4-BE49-F238E27FC236}">
-                <a16:creationId xmlns:a16="http://schemas.microsoft.com/office/drawing/2014/main" id="{A5E94ADD-03F4-B94C-9F7E-C5A66F395A8C}"/>
-              </a:ext>
-            </a:extLst>
-          </p:cNvPr>
-          <p:cNvSpPr>
-            <a:spLocks noGrp="1"/>
-          </p:cNvSpPr>
-          <p:nvPr>
-            <p:ph idx="1"/>
-          </p:nvPr>
-        </p:nvSpPr>
-        <p:spPr>
-          <a:xfrm>
-            <a:off x="1451579" y="2015732"/>
-            <a:ext cx="9603275" cy="4156468"/>
-          </a:xfrm>
-        </p:spPr>
-        <p:txBody>
-          <a:bodyPr>
-            <a:normAutofit fontScale="92500" lnSpcReduction="20000"/>
-          </a:bodyPr>
-          <a:lstStyle/>
-          <a:p>
-            <a:r>
-              <a:rPr kumimoji="1" lang="zh-CN" altLang="en-US" dirty="0"/>
-              <a:t>套件引用：</a:t>
-            </a:r>
-            <a:endParaRPr kumimoji="1" lang="en-US" altLang="zh-CN" dirty="0"/>
-          </a:p>
-          <a:p>
-            <a:pPr lvl="1"/>
-            <a:r>
-              <a:rPr lang="en-US" dirty="0">
-                <a:hlinkClick r:id="rId2"/>
-              </a:rPr>
-              <a:t>https://cran.r-project.org/web/packages/hash/hash.pdf</a:t>
-            </a:r>
-            <a:endParaRPr lang="en-US" dirty="0"/>
-          </a:p>
-          <a:p>
-            <a:pPr lvl="1"/>
-            <a:r>
-              <a:rPr lang="en-US" dirty="0">
-                <a:hlinkClick r:id="rId3"/>
-              </a:rPr>
-              <a:t>https://stackoverflow.com/questions/23765996/get-all-keys-from-ruby-hash</a:t>
-            </a:r>
-            <a:endParaRPr lang="en-US" dirty="0"/>
-          </a:p>
-          <a:p>
-            <a:pPr lvl="1"/>
-            <a:r>
-              <a:rPr lang="en-US" dirty="0">
-                <a:hlinkClick r:id="rId4"/>
-              </a:rPr>
-              <a:t>https://www.rdocumentation.org/packages/tibble/versions/1.4.2/topics/add_column</a:t>
-            </a:r>
-            <a:endParaRPr lang="en-US" dirty="0"/>
-          </a:p>
-          <a:p>
-            <a:pPr lvl="1"/>
-            <a:r>
-              <a:rPr lang="en-US" dirty="0">
-                <a:hlinkClick r:id="rId5"/>
-              </a:rPr>
-              <a:t>https://stackoverflow.com/questions/45741498/add-column-in-tibble-with-variable-column-name</a:t>
-            </a:r>
-            <a:endParaRPr lang="en-US" dirty="0"/>
-          </a:p>
-          <a:p>
-            <a:pPr lvl="1"/>
-            <a:r>
-              <a:rPr lang="en-US" dirty="0">
-                <a:hlinkClick r:id="rId6"/>
-              </a:rPr>
-              <a:t>https://statmath.wu.ac.at/projects/vcd/</a:t>
-            </a:r>
-            <a:endParaRPr lang="en-US" dirty="0"/>
-          </a:p>
-          <a:p>
-            <a:pPr lvl="1"/>
-            <a:r>
-              <a:rPr lang="en-US" dirty="0">
-                <a:hlinkClick r:id="rId7"/>
-              </a:rPr>
-              <a:t>https://rdrr.io/cran/infotheo/man/mutinformation.html</a:t>
-            </a:r>
-            <a:endParaRPr lang="en-US" dirty="0"/>
-          </a:p>
-          <a:p>
-            <a:pPr lvl="1"/>
-            <a:r>
-              <a:rPr lang="en-US" dirty="0">
-                <a:hlinkClick r:id="rId8"/>
-              </a:rPr>
-              <a:t>https://cran.r-project.org/web/packages/infotheo/infotheo.pdf</a:t>
-            </a:r>
-            <a:endParaRPr lang="en-US" dirty="0"/>
-          </a:p>
-          <a:p>
-            <a:pPr lvl="1"/>
-            <a:r>
-              <a:rPr lang="en-US" dirty="0">
-                <a:hlinkClick r:id="rId9"/>
-              </a:rPr>
-              <a:t>https://www.rdocumentation.org/packages/stringr</a:t>
-            </a:r>
-            <a:endParaRPr lang="en-US" dirty="0"/>
-          </a:p>
-          <a:p>
-            <a:pPr lvl="1"/>
-            <a:r>
-              <a:rPr lang="en-US" dirty="0">
-                <a:hlinkClick r:id="rId10"/>
-              </a:rPr>
-              <a:t>https://stringr.tidyverse.org/reference/str_detect.html</a:t>
-            </a:r>
-            <a:endParaRPr lang="en-US" dirty="0"/>
-          </a:p>
-          <a:p>
-            <a:pPr lvl="1"/>
-            <a:r>
-              <a:rPr lang="en-US" dirty="0">
-                <a:hlinkClick r:id="rId11"/>
-              </a:rPr>
-              <a:t>https://www.rdocumentation.org/packages/vcd/</a:t>
-            </a:r>
-            <a:endParaRPr kumimoji="1" lang="en-US" altLang="zh-TW" dirty="0"/>
-          </a:p>
-          <a:p>
-            <a:pPr lvl="1"/>
-            <a:endParaRPr kumimoji="1" lang="en-US" altLang="zh-TW" dirty="0"/>
-          </a:p>
-          <a:p>
-            <a:pPr lvl="1"/>
-            <a:endParaRPr kumimoji="1" lang="en-US" altLang="zh-TW" dirty="0"/>
-          </a:p>
-        </p:txBody>
-      </p:sp>
-    </p:spTree>
-    <p:extLst>
-      <p:ext uri="{BB962C8B-B14F-4D97-AF65-F5344CB8AC3E}">
-        <p14:creationId xmlns:p14="http://schemas.microsoft.com/office/powerpoint/2010/main" val="3926490653"/>
-      </p:ext>
-    </p:extLst>
-  </p:cSld>
-  <p:clrMapOvr>
-    <a:masterClrMapping/>
-  </p:clrMapOvr>
-</p:sld>
-</file>
-
-<file path=ppt/slides/slide42.xml><?xml version="1.0" encoding="utf-8"?>
 <p:sld xmlns:a="http://schemas.openxmlformats.org/drawingml/2006/main" xmlns:r="http://schemas.openxmlformats.org/officeDocument/2006/relationships" xmlns:p="http://schemas.openxmlformats.org/presentationml/2006/main">
   <p:cSld>
     <p:spTree>

</xml_diff>